<commit_message>
Added components from teaching demo
</commit_message>
<xml_diff>
--- a/R/Basic Network Analysis Using R/Basic Network Analysis using R.pptx
+++ b/R/Basic Network Analysis Using R/Basic Network Analysis using R.pptx
@@ -7,16 +7,22 @@
   <p:sldIdLst>
     <p:sldId id="256" r:id="rId2"/>
     <p:sldId id="257" r:id="rId3"/>
-    <p:sldId id="258" r:id="rId4"/>
-    <p:sldId id="259" r:id="rId5"/>
-    <p:sldId id="260" r:id="rId6"/>
-    <p:sldId id="262" r:id="rId7"/>
-    <p:sldId id="261" r:id="rId8"/>
-    <p:sldId id="263" r:id="rId9"/>
-    <p:sldId id="264" r:id="rId10"/>
+    <p:sldId id="266" r:id="rId4"/>
+    <p:sldId id="265" r:id="rId5"/>
+    <p:sldId id="258" r:id="rId6"/>
+    <p:sldId id="259" r:id="rId7"/>
+    <p:sldId id="260" r:id="rId8"/>
+    <p:sldId id="262" r:id="rId9"/>
+    <p:sldId id="267" r:id="rId10"/>
+    <p:sldId id="261" r:id="rId11"/>
+    <p:sldId id="263" r:id="rId12"/>
+    <p:sldId id="264" r:id="rId13"/>
   </p:sldIdLst>
   <p:sldSz cx="12192000" cy="6858000"/>
   <p:notesSz cx="6858000" cy="9144000"/>
+  <p:custDataLst>
+    <p:tags r:id="rId14"/>
+  </p:custDataLst>
   <p:defaultTextStyle>
     <a:defPPr>
       <a:defRPr lang="en-US"/>
@@ -112,6 +118,11 @@
       </a:defRPr>
     </a:lvl9pPr>
   </p:defaultTextStyle>
+  <p:extLst>
+    <p:ext uri="{EFAFB233-063F-42B5-8137-9DF3F51BA10A}">
+      <p15:sldGuideLst xmlns:p15="http://schemas.microsoft.com/office/powerpoint/2012/main"/>
+    </p:ext>
+  </p:extLst>
 </p:presentation>
 </file>
 
@@ -301,7 +312,7 @@
           <a:p>
             <a:fld id="{4AAD347D-5ACD-4C99-B74B-A9C85AD731AF}" type="datetimeFigureOut">
               <a:rPr lang="en-US" dirty="0"/>
-              <a:t>10/8/2018</a:t>
+              <a:t>10/9/2018</a:t>
             </a:fld>
             <a:endParaRPr lang="en-US" dirty="0"/>
           </a:p>
@@ -571,7 +582,7 @@
           <a:p>
             <a:fld id="{4509A250-FF31-4206-8172-F9D3106AACB1}" type="datetimeFigureOut">
               <a:rPr lang="en-US" dirty="0"/>
-              <a:t>10/8/2018</a:t>
+              <a:t>10/9/2018</a:t>
             </a:fld>
             <a:endParaRPr lang="en-US" dirty="0"/>
           </a:p>
@@ -760,7 +771,7 @@
           <a:p>
             <a:fld id="{4509A250-FF31-4206-8172-F9D3106AACB1}" type="datetimeFigureOut">
               <a:rPr lang="en-US" dirty="0"/>
-              <a:t>10/8/2018</a:t>
+              <a:t>10/9/2018</a:t>
             </a:fld>
             <a:endParaRPr lang="en-US" dirty="0"/>
           </a:p>
@@ -1028,7 +1039,7 @@
           <a:p>
             <a:fld id="{4509A250-FF31-4206-8172-F9D3106AACB1}" type="datetimeFigureOut">
               <a:rPr lang="en-US" dirty="0"/>
-              <a:t>10/8/2018</a:t>
+              <a:t>10/9/2018</a:t>
             </a:fld>
             <a:endParaRPr lang="en-US" dirty="0"/>
           </a:p>
@@ -1364,7 +1375,7 @@
           <a:p>
             <a:fld id="{4509A250-FF31-4206-8172-F9D3106AACB1}" type="datetimeFigureOut">
               <a:rPr lang="en-US" dirty="0"/>
-              <a:t>10/8/2018</a:t>
+              <a:t>10/9/2018</a:t>
             </a:fld>
             <a:endParaRPr lang="en-US" dirty="0"/>
           </a:p>
@@ -1982,7 +1993,7 @@
           <a:p>
             <a:fld id="{4509A250-FF31-4206-8172-F9D3106AACB1}" type="datetimeFigureOut">
               <a:rPr lang="en-US" dirty="0"/>
-              <a:t>10/8/2018</a:t>
+              <a:t>10/9/2018</a:t>
             </a:fld>
             <a:endParaRPr lang="en-US" dirty="0"/>
           </a:p>
@@ -2837,7 +2848,7 @@
           <a:p>
             <a:fld id="{4509A250-FF31-4206-8172-F9D3106AACB1}" type="datetimeFigureOut">
               <a:rPr lang="en-US" dirty="0"/>
-              <a:t>10/8/2018</a:t>
+              <a:t>10/9/2018</a:t>
             </a:fld>
             <a:endParaRPr lang="en-US" dirty="0"/>
           </a:p>
@@ -3002,7 +3013,7 @@
           <a:p>
             <a:fld id="{4509A250-FF31-4206-8172-F9D3106AACB1}" type="datetimeFigureOut">
               <a:rPr lang="en-US" dirty="0"/>
-              <a:t>10/8/2018</a:t>
+              <a:t>10/9/2018</a:t>
             </a:fld>
             <a:endParaRPr lang="en-US" dirty="0"/>
           </a:p>
@@ -3177,7 +3188,7 @@
           <a:p>
             <a:fld id="{4509A250-FF31-4206-8172-F9D3106AACB1}" type="datetimeFigureOut">
               <a:rPr lang="en-US" dirty="0"/>
-              <a:t>10/8/2018</a:t>
+              <a:t>10/9/2018</a:t>
             </a:fld>
             <a:endParaRPr lang="en-US" dirty="0"/>
           </a:p>
@@ -3342,7 +3353,7 @@
           <a:p>
             <a:fld id="{4509A250-FF31-4206-8172-F9D3106AACB1}" type="datetimeFigureOut">
               <a:rPr lang="en-US" dirty="0"/>
-              <a:t>10/8/2018</a:t>
+              <a:t>10/9/2018</a:t>
             </a:fld>
             <a:endParaRPr lang="en-US" dirty="0"/>
           </a:p>
@@ -3584,7 +3595,7 @@
           <a:p>
             <a:fld id="{9796027F-7875-4030-9381-8BD8C4F21935}" type="datetimeFigureOut">
               <a:rPr lang="en-US" dirty="0"/>
-              <a:t>10/8/2018</a:t>
+              <a:t>10/9/2018</a:t>
             </a:fld>
             <a:endParaRPr lang="en-US" dirty="0"/>
           </a:p>
@@ -3871,7 +3882,7 @@
           <a:p>
             <a:fld id="{9796027F-7875-4030-9381-8BD8C4F21935}" type="datetimeFigureOut">
               <a:rPr lang="en-US" dirty="0"/>
-              <a:t>10/8/2018</a:t>
+              <a:t>10/9/2018</a:t>
             </a:fld>
             <a:endParaRPr lang="en-US" dirty="0"/>
           </a:p>
@@ -4310,7 +4321,7 @@
           <a:p>
             <a:fld id="{9796027F-7875-4030-9381-8BD8C4F21935}" type="datetimeFigureOut">
               <a:rPr lang="en-US" dirty="0"/>
-              <a:t>10/8/2018</a:t>
+              <a:t>10/9/2018</a:t>
             </a:fld>
             <a:endParaRPr lang="en-US" dirty="0"/>
           </a:p>
@@ -4423,7 +4434,7 @@
           <a:p>
             <a:fld id="{4509A250-FF31-4206-8172-F9D3106AACB1}" type="datetimeFigureOut">
               <a:rPr lang="en-US" dirty="0"/>
-              <a:t>10/8/2018</a:t>
+              <a:t>10/9/2018</a:t>
             </a:fld>
             <a:endParaRPr lang="en-US" dirty="0"/>
           </a:p>
@@ -4513,7 +4524,7 @@
           <a:p>
             <a:fld id="{4509A250-FF31-4206-8172-F9D3106AACB1}" type="datetimeFigureOut">
               <a:rPr lang="en-US" dirty="0"/>
-              <a:t>10/8/2018</a:t>
+              <a:t>10/9/2018</a:t>
             </a:fld>
             <a:endParaRPr lang="en-US" dirty="0"/>
           </a:p>
@@ -4787,7 +4798,7 @@
           <a:p>
             <a:fld id="{4509A250-FF31-4206-8172-F9D3106AACB1}" type="datetimeFigureOut">
               <a:rPr lang="en-US" dirty="0"/>
-              <a:t>10/8/2018</a:t>
+              <a:t>10/9/2018</a:t>
             </a:fld>
             <a:endParaRPr lang="en-US" dirty="0"/>
           </a:p>
@@ -5057,7 +5068,7 @@
           <a:p>
             <a:fld id="{4509A250-FF31-4206-8172-F9D3106AACB1}" type="datetimeFigureOut">
               <a:rPr lang="en-US" dirty="0"/>
-              <a:t>10/8/2018</a:t>
+              <a:t>10/9/2018</a:t>
             </a:fld>
             <a:endParaRPr lang="en-US" dirty="0"/>
           </a:p>
@@ -5481,7 +5492,7 @@
           <a:p>
             <a:fld id="{4AAD347D-5ACD-4C99-B74B-A9C85AD731AF}" type="datetimeFigureOut">
               <a:rPr lang="en-US" dirty="0"/>
-              <a:t>10/8/2018</a:t>
+              <a:t>10/9/2018</a:t>
             </a:fld>
             <a:endParaRPr lang="en-US" dirty="0"/>
           </a:p>
@@ -5596,7 +5607,7 @@
           <a:spcPct val="0"/>
         </a:spcBef>
         <a:buNone/>
-        <a:defRPr sz="4200" b="0" i="0" kern="1200">
+        <a:defRPr sz="4200" b="0" i="0" u="none" kern="1200">
           <a:solidFill>
             <a:schemeClr val="tx2"/>
           </a:solidFill>
@@ -6078,6 +6089,417 @@
 </p:sld>
 </file>
 
+<file path=ppt/slides/slide10.xml><?xml version="1.0" encoding="utf-8"?>
+<p:sld xmlns:a="http://schemas.openxmlformats.org/drawingml/2006/main" xmlns:r="http://schemas.openxmlformats.org/officeDocument/2006/relationships" xmlns:p="http://schemas.openxmlformats.org/presentationml/2006/main">
+  <p:cSld>
+    <p:spTree>
+      <p:nvGrpSpPr>
+        <p:cNvPr id="1" name=""/>
+        <p:cNvGrpSpPr/>
+        <p:nvPr/>
+      </p:nvGrpSpPr>
+      <p:grpSpPr>
+        <a:xfrm>
+          <a:off x="0" y="0"/>
+          <a:ext cx="0" cy="0"/>
+          <a:chOff x="0" y="0"/>
+          <a:chExt cx="0" cy="0"/>
+        </a:xfrm>
+      </p:grpSpPr>
+      <p:sp>
+        <p:nvSpPr>
+          <p:cNvPr id="2" name="Title 1"/>
+          <p:cNvSpPr>
+            <a:spLocks noGrp="1"/>
+          </p:cNvSpPr>
+          <p:nvPr>
+            <p:ph type="title"/>
+          </p:nvPr>
+        </p:nvSpPr>
+        <p:spPr/>
+        <p:txBody>
+          <a:bodyPr/>
+          <a:lstStyle/>
+          <a:p>
+            <a:r>
+              <a:rPr lang="en-US" dirty="0" smtClean="0"/>
+              <a:t>Defining other Terms	</a:t>
+            </a:r>
+            <a:endParaRPr lang="en-US" dirty="0"/>
+          </a:p>
+        </p:txBody>
+      </p:sp>
+      <p:sp>
+        <p:nvSpPr>
+          <p:cNvPr id="3" name="Content Placeholder 2"/>
+          <p:cNvSpPr>
+            <a:spLocks noGrp="1"/>
+          </p:cNvSpPr>
+          <p:nvPr>
+            <p:ph idx="1"/>
+          </p:nvPr>
+        </p:nvSpPr>
+        <p:spPr/>
+        <p:txBody>
+          <a:bodyPr/>
+          <a:lstStyle/>
+          <a:p>
+            <a:r>
+              <a:rPr lang="en-US" dirty="0" smtClean="0"/>
+              <a:t>Homophily- extent to which two nodes are similar</a:t>
+            </a:r>
+          </a:p>
+          <a:p>
+            <a:pPr lvl="1"/>
+            <a:r>
+              <a:rPr lang="en-US" dirty="0" smtClean="0"/>
+              <a:t>How close incomes are</a:t>
+            </a:r>
+          </a:p>
+          <a:p>
+            <a:r>
+              <a:rPr lang="en-US" dirty="0" smtClean="0"/>
+              <a:t>Density- proportion of ties relative to potential ties</a:t>
+            </a:r>
+          </a:p>
+          <a:p>
+            <a:pPr lvl="1"/>
+            <a:r>
+              <a:rPr lang="en-US" dirty="0" smtClean="0"/>
+              <a:t>Out of all possible ties, what proportion are observed</a:t>
+            </a:r>
+          </a:p>
+          <a:p>
+            <a:r>
+              <a:rPr lang="en-US" dirty="0" smtClean="0"/>
+              <a:t>Distance</a:t>
+            </a:r>
+          </a:p>
+          <a:p>
+            <a:pPr lvl="1"/>
+            <a:r>
+              <a:rPr lang="en-US" dirty="0" smtClean="0"/>
+              <a:t>Minimum number of ties needed to connect two nodes</a:t>
+            </a:r>
+          </a:p>
+          <a:p>
+            <a:r>
+              <a:rPr lang="en-US" dirty="0" smtClean="0"/>
+              <a:t>Centrality</a:t>
+            </a:r>
+          </a:p>
+          <a:p>
+            <a:pPr lvl="1"/>
+            <a:r>
+              <a:rPr lang="en-US" dirty="0" smtClean="0"/>
+              <a:t>Importance or influence of a node (more on this later)</a:t>
+            </a:r>
+            <a:endParaRPr lang="en-US" dirty="0"/>
+          </a:p>
+          <a:p>
+            <a:pPr lvl="1"/>
+            <a:endParaRPr lang="en-US" dirty="0" smtClean="0"/>
+          </a:p>
+          <a:p>
+            <a:pPr lvl="1"/>
+            <a:endParaRPr lang="en-US" dirty="0"/>
+          </a:p>
+        </p:txBody>
+      </p:sp>
+    </p:spTree>
+    <p:extLst>
+      <p:ext uri="{BB962C8B-B14F-4D97-AF65-F5344CB8AC3E}">
+        <p14:creationId xmlns:p14="http://schemas.microsoft.com/office/powerpoint/2010/main" val="1676824317"/>
+      </p:ext>
+    </p:extLst>
+  </p:cSld>
+  <p:clrMapOvr>
+    <a:masterClrMapping/>
+  </p:clrMapOvr>
+</p:sld>
+</file>
+
+<file path=ppt/slides/slide11.xml><?xml version="1.0" encoding="utf-8"?>
+<p:sld xmlns:a="http://schemas.openxmlformats.org/drawingml/2006/main" xmlns:r="http://schemas.openxmlformats.org/officeDocument/2006/relationships" xmlns:p="http://schemas.openxmlformats.org/presentationml/2006/main">
+  <p:cSld>
+    <p:spTree>
+      <p:nvGrpSpPr>
+        <p:cNvPr id="1" name=""/>
+        <p:cNvGrpSpPr/>
+        <p:nvPr/>
+      </p:nvGrpSpPr>
+      <p:grpSpPr>
+        <a:xfrm>
+          <a:off x="0" y="0"/>
+          <a:ext cx="0" cy="0"/>
+          <a:chOff x="0" y="0"/>
+          <a:chExt cx="0" cy="0"/>
+        </a:xfrm>
+      </p:grpSpPr>
+      <p:sp>
+        <p:nvSpPr>
+          <p:cNvPr id="2" name="Title 1"/>
+          <p:cNvSpPr>
+            <a:spLocks noGrp="1"/>
+          </p:cNvSpPr>
+          <p:nvPr>
+            <p:ph type="title"/>
+          </p:nvPr>
+        </p:nvSpPr>
+        <p:spPr/>
+        <p:txBody>
+          <a:bodyPr/>
+          <a:lstStyle/>
+          <a:p>
+            <a:r>
+              <a:rPr lang="en-US" dirty="0" smtClean="0"/>
+              <a:t>Data: Adjacency Matrix vs Edge list</a:t>
+            </a:r>
+            <a:endParaRPr lang="en-US" dirty="0"/>
+          </a:p>
+        </p:txBody>
+      </p:sp>
+      <p:sp>
+        <p:nvSpPr>
+          <p:cNvPr id="3" name="Content Placeholder 2"/>
+          <p:cNvSpPr>
+            <a:spLocks noGrp="1"/>
+          </p:cNvSpPr>
+          <p:nvPr>
+            <p:ph idx="1"/>
+          </p:nvPr>
+        </p:nvSpPr>
+        <p:spPr/>
+        <p:txBody>
+          <a:bodyPr/>
+          <a:lstStyle/>
+          <a:p>
+            <a:r>
+              <a:rPr lang="en-US" dirty="0" smtClean="0"/>
+              <a:t>Adjacency Matrix- values show connection between nodes</a:t>
+            </a:r>
+          </a:p>
+          <a:p>
+            <a:pPr lvl="1"/>
+            <a:r>
+              <a:rPr lang="en-US" dirty="0" smtClean="0"/>
+              <a:t>Often omit 0, just care about 1 if binary</a:t>
+            </a:r>
+            <a:endParaRPr lang="en-US" dirty="0"/>
+          </a:p>
+        </p:txBody>
+      </p:sp>
+      <p:pic>
+        <p:nvPicPr>
+          <p:cNvPr id="5" name="Picture 4"/>
+          <p:cNvPicPr>
+            <a:picLocks noChangeAspect="1"/>
+          </p:cNvPicPr>
+          <p:nvPr/>
+        </p:nvPicPr>
+        <p:blipFill>
+          <a:blip r:embed="rId2"/>
+          <a:stretch>
+            <a:fillRect/>
+          </a:stretch>
+        </p:blipFill>
+        <p:spPr>
+          <a:xfrm>
+            <a:off x="1103312" y="3196807"/>
+            <a:ext cx="3593379" cy="3563557"/>
+          </a:xfrm>
+          <a:prstGeom prst="rect">
+            <a:avLst/>
+          </a:prstGeom>
+        </p:spPr>
+      </p:pic>
+      <p:pic>
+        <p:nvPicPr>
+          <p:cNvPr id="6" name="Picture 5"/>
+          <p:cNvPicPr>
+            <a:picLocks noChangeAspect="1"/>
+          </p:cNvPicPr>
+          <p:nvPr/>
+        </p:nvPicPr>
+        <p:blipFill>
+          <a:blip r:embed="rId3"/>
+          <a:stretch>
+            <a:fillRect/>
+          </a:stretch>
+        </p:blipFill>
+        <p:spPr>
+          <a:xfrm>
+            <a:off x="6010753" y="3303241"/>
+            <a:ext cx="3382629" cy="3457123"/>
+          </a:xfrm>
+          <a:prstGeom prst="rect">
+            <a:avLst/>
+          </a:prstGeom>
+        </p:spPr>
+      </p:pic>
+    </p:spTree>
+    <p:extLst>
+      <p:ext uri="{BB962C8B-B14F-4D97-AF65-F5344CB8AC3E}">
+        <p14:creationId xmlns:p14="http://schemas.microsoft.com/office/powerpoint/2010/main" val="3320095233"/>
+      </p:ext>
+    </p:extLst>
+  </p:cSld>
+  <p:clrMapOvr>
+    <a:masterClrMapping/>
+  </p:clrMapOvr>
+</p:sld>
+</file>
+
+<file path=ppt/slides/slide12.xml><?xml version="1.0" encoding="utf-8"?>
+<p:sld xmlns:a="http://schemas.openxmlformats.org/drawingml/2006/main" xmlns:r="http://schemas.openxmlformats.org/officeDocument/2006/relationships" xmlns:p="http://schemas.openxmlformats.org/presentationml/2006/main">
+  <p:cSld>
+    <p:spTree>
+      <p:nvGrpSpPr>
+        <p:cNvPr id="1" name=""/>
+        <p:cNvGrpSpPr/>
+        <p:nvPr/>
+      </p:nvGrpSpPr>
+      <p:grpSpPr>
+        <a:xfrm>
+          <a:off x="0" y="0"/>
+          <a:ext cx="0" cy="0"/>
+          <a:chOff x="0" y="0"/>
+          <a:chExt cx="0" cy="0"/>
+        </a:xfrm>
+      </p:grpSpPr>
+      <p:sp>
+        <p:nvSpPr>
+          <p:cNvPr id="2" name="Title 1"/>
+          <p:cNvSpPr>
+            <a:spLocks noGrp="1"/>
+          </p:cNvSpPr>
+          <p:nvPr>
+            <p:ph type="title"/>
+          </p:nvPr>
+        </p:nvSpPr>
+        <p:spPr/>
+        <p:txBody>
+          <a:bodyPr/>
+          <a:lstStyle/>
+          <a:p>
+            <a:r>
+              <a:rPr lang="en-US" dirty="0" err="1" smtClean="0"/>
+              <a:t>Edgelist</a:t>
+            </a:r>
+            <a:endParaRPr lang="en-US" dirty="0"/>
+          </a:p>
+        </p:txBody>
+      </p:sp>
+      <p:sp>
+        <p:nvSpPr>
+          <p:cNvPr id="3" name="Content Placeholder 2"/>
+          <p:cNvSpPr>
+            <a:spLocks noGrp="1"/>
+          </p:cNvSpPr>
+          <p:nvPr>
+            <p:ph idx="1"/>
+          </p:nvPr>
+        </p:nvSpPr>
+        <p:spPr/>
+        <p:txBody>
+          <a:bodyPr/>
+          <a:lstStyle/>
+          <a:p>
+            <a:r>
+              <a:rPr lang="en-US" dirty="0" smtClean="0"/>
+              <a:t>2 columns- node 1, node 2</a:t>
+            </a:r>
+          </a:p>
+          <a:p>
+            <a:pPr lvl="1"/>
+            <a:r>
+              <a:rPr lang="en-US" dirty="0" smtClean="0"/>
+              <a:t>Sometimes 3</a:t>
+            </a:r>
+            <a:r>
+              <a:rPr lang="en-US" baseline="30000" dirty="0" smtClean="0"/>
+              <a:t>rd</a:t>
+            </a:r>
+            <a:r>
+              <a:rPr lang="en-US" dirty="0" smtClean="0"/>
+              <a:t> column for weight if not binary</a:t>
+            </a:r>
+          </a:p>
+          <a:p>
+            <a:pPr lvl="1"/>
+            <a:r>
+              <a:rPr lang="en-US" dirty="0" smtClean="0"/>
+              <a:t>Missing edges not included </a:t>
+            </a:r>
+            <a:r>
+              <a:rPr lang="en-US" smtClean="0"/>
+              <a:t>(usually)</a:t>
+            </a:r>
+            <a:endParaRPr lang="en-US" dirty="0"/>
+          </a:p>
+        </p:txBody>
+      </p:sp>
+      <p:pic>
+        <p:nvPicPr>
+          <p:cNvPr id="4" name="Picture 3"/>
+          <p:cNvPicPr>
+            <a:picLocks noChangeAspect="1"/>
+          </p:cNvPicPr>
+          <p:nvPr/>
+        </p:nvPicPr>
+        <p:blipFill>
+          <a:blip r:embed="rId2"/>
+          <a:stretch>
+            <a:fillRect/>
+          </a:stretch>
+        </p:blipFill>
+        <p:spPr>
+          <a:xfrm>
+            <a:off x="8147292" y="1853248"/>
+            <a:ext cx="2297400" cy="4597202"/>
+          </a:xfrm>
+          <a:prstGeom prst="rect">
+            <a:avLst/>
+          </a:prstGeom>
+        </p:spPr>
+      </p:pic>
+      <p:pic>
+        <p:nvPicPr>
+          <p:cNvPr id="5" name="Picture 4"/>
+          <p:cNvPicPr>
+            <a:picLocks noChangeAspect="1"/>
+          </p:cNvPicPr>
+          <p:nvPr/>
+        </p:nvPicPr>
+        <p:blipFill>
+          <a:blip r:embed="rId3"/>
+          <a:stretch>
+            <a:fillRect/>
+          </a:stretch>
+        </p:blipFill>
+        <p:spPr>
+          <a:xfrm>
+            <a:off x="2149643" y="4550826"/>
+            <a:ext cx="4650750" cy="1447200"/>
+          </a:xfrm>
+          <a:prstGeom prst="rect">
+            <a:avLst/>
+          </a:prstGeom>
+        </p:spPr>
+      </p:pic>
+    </p:spTree>
+    <p:extLst>
+      <p:ext uri="{BB962C8B-B14F-4D97-AF65-F5344CB8AC3E}">
+        <p14:creationId xmlns:p14="http://schemas.microsoft.com/office/powerpoint/2010/main" val="684901235"/>
+      </p:ext>
+    </p:extLst>
+  </p:cSld>
+  <p:clrMapOvr>
+    <a:masterClrMapping/>
+  </p:clrMapOvr>
+</p:sld>
+</file>
+
 <file path=ppt/slides/slide2.xml><?xml version="1.0" encoding="utf-8"?>
 <p:sld xmlns:a="http://schemas.openxmlformats.org/drawingml/2006/main" xmlns:r="http://schemas.openxmlformats.org/officeDocument/2006/relationships" xmlns:p="http://schemas.openxmlformats.org/presentationml/2006/main">
   <p:cSld>
@@ -6135,8 +6557,20 @@
           <a:p>
             <a:r>
               <a:rPr lang="en-US" dirty="0" smtClean="0"/>
-              <a:t>Growing field of Social Sciences over the last few decades</a:t>
-            </a:r>
+              <a:t>Growing field of Social Sciences over the last few </a:t>
+            </a:r>
+            <a:r>
+              <a:rPr lang="en-US" dirty="0" smtClean="0"/>
+              <a:t>decades</a:t>
+            </a:r>
+          </a:p>
+          <a:p>
+            <a:pPr lvl="1"/>
+            <a:r>
+              <a:rPr lang="en-US" dirty="0" smtClean="0"/>
+              <a:t>Increased availability of data and computing power</a:t>
+            </a:r>
+            <a:endParaRPr lang="en-US" dirty="0" smtClean="0"/>
           </a:p>
           <a:p>
             <a:r>
@@ -6196,6 +6630,227 @@
 </file>
 
 <file path=ppt/slides/slide3.xml><?xml version="1.0" encoding="utf-8"?>
+<p:sld xmlns:a="http://schemas.openxmlformats.org/drawingml/2006/main" xmlns:r="http://schemas.openxmlformats.org/officeDocument/2006/relationships" xmlns:p="http://schemas.openxmlformats.org/presentationml/2006/main">
+  <p:cSld>
+    <p:spTree>
+      <p:nvGrpSpPr>
+        <p:cNvPr id="1" name=""/>
+        <p:cNvGrpSpPr/>
+        <p:nvPr/>
+      </p:nvGrpSpPr>
+      <p:grpSpPr>
+        <a:xfrm>
+          <a:off x="0" y="0"/>
+          <a:ext cx="0" cy="0"/>
+          <a:chOff x="0" y="0"/>
+          <a:chExt cx="0" cy="0"/>
+        </a:xfrm>
+      </p:grpSpPr>
+      <p:sp>
+        <p:nvSpPr>
+          <p:cNvPr id="2" name="Title 1"/>
+          <p:cNvSpPr>
+            <a:spLocks noGrp="1"/>
+          </p:cNvSpPr>
+          <p:nvPr>
+            <p:ph type="title"/>
+          </p:nvPr>
+        </p:nvSpPr>
+        <p:spPr/>
+        <p:txBody>
+          <a:bodyPr/>
+          <a:lstStyle/>
+          <a:p>
+            <a:r>
+              <a:rPr lang="en-US" dirty="0"/>
+              <a:t>Who Studies Networks?</a:t>
+            </a:r>
+          </a:p>
+        </p:txBody>
+      </p:sp>
+      <p:sp>
+        <p:nvSpPr>
+          <p:cNvPr id="3" name="Content Placeholder 2"/>
+          <p:cNvSpPr>
+            <a:spLocks noGrp="1"/>
+          </p:cNvSpPr>
+          <p:nvPr>
+            <p:ph idx="1"/>
+          </p:nvPr>
+        </p:nvSpPr>
+        <p:spPr/>
+        <p:txBody>
+          <a:bodyPr/>
+          <a:lstStyle/>
+          <a:p>
+            <a:r>
+              <a:rPr lang="en-US" dirty="0"/>
+              <a:t>Physicists</a:t>
+            </a:r>
+          </a:p>
+          <a:p>
+            <a:r>
+              <a:rPr lang="en-US" dirty="0"/>
+              <a:t>Computer Scientists</a:t>
+            </a:r>
+          </a:p>
+          <a:p>
+            <a:r>
+              <a:rPr lang="en-US" dirty="0"/>
+              <a:t>Applied Mathematicians</a:t>
+            </a:r>
+          </a:p>
+          <a:p>
+            <a:r>
+              <a:rPr lang="en-US" dirty="0"/>
+              <a:t>Statisticians</a:t>
+            </a:r>
+          </a:p>
+          <a:p>
+            <a:r>
+              <a:rPr lang="en-US" dirty="0"/>
+              <a:t>Biologists</a:t>
+            </a:r>
+          </a:p>
+          <a:p>
+            <a:r>
+              <a:rPr lang="en-US" dirty="0"/>
+              <a:t>Ecologists</a:t>
+            </a:r>
+          </a:p>
+          <a:p>
+            <a:r>
+              <a:rPr lang="en-US" dirty="0"/>
+              <a:t>Sociologists</a:t>
+            </a:r>
+          </a:p>
+          <a:p>
+            <a:r>
+              <a:rPr lang="en-US" dirty="0"/>
+              <a:t>Political Scientists</a:t>
+            </a:r>
+          </a:p>
+          <a:p>
+            <a:r>
+              <a:rPr lang="en-US" dirty="0" smtClean="0"/>
+              <a:t>And Everyone Else!!!</a:t>
+            </a:r>
+            <a:endParaRPr lang="en-US" dirty="0"/>
+          </a:p>
+        </p:txBody>
+      </p:sp>
+    </p:spTree>
+    <p:extLst>
+      <p:ext uri="{BB962C8B-B14F-4D97-AF65-F5344CB8AC3E}">
+        <p14:creationId xmlns:p14="http://schemas.microsoft.com/office/powerpoint/2010/main" val="1615276974"/>
+      </p:ext>
+    </p:extLst>
+  </p:cSld>
+  <p:clrMapOvr>
+    <a:masterClrMapping/>
+  </p:clrMapOvr>
+</p:sld>
+</file>
+
+<file path=ppt/slides/slide4.xml><?xml version="1.0" encoding="utf-8"?>
+<p:sld xmlns:a="http://schemas.openxmlformats.org/drawingml/2006/main" xmlns:r="http://schemas.openxmlformats.org/officeDocument/2006/relationships" xmlns:p="http://schemas.openxmlformats.org/presentationml/2006/main">
+  <p:cSld>
+    <p:spTree>
+      <p:nvGrpSpPr>
+        <p:cNvPr id="1" name=""/>
+        <p:cNvGrpSpPr/>
+        <p:nvPr/>
+      </p:nvGrpSpPr>
+      <p:grpSpPr>
+        <a:xfrm>
+          <a:off x="0" y="0"/>
+          <a:ext cx="0" cy="0"/>
+          <a:chOff x="0" y="0"/>
+          <a:chExt cx="0" cy="0"/>
+        </a:xfrm>
+      </p:grpSpPr>
+      <p:sp>
+        <p:nvSpPr>
+          <p:cNvPr id="2" name="Title 1"/>
+          <p:cNvSpPr>
+            <a:spLocks noGrp="1"/>
+          </p:cNvSpPr>
+          <p:nvPr>
+            <p:ph type="title"/>
+          </p:nvPr>
+        </p:nvSpPr>
+        <p:spPr/>
+        <p:txBody>
+          <a:bodyPr/>
+          <a:lstStyle/>
+          <a:p>
+            <a:r>
+              <a:rPr lang="en-US" dirty="0" smtClean="0"/>
+              <a:t>Assumptions</a:t>
+            </a:r>
+            <a:endParaRPr lang="en-US" dirty="0"/>
+          </a:p>
+        </p:txBody>
+      </p:sp>
+      <p:sp>
+        <p:nvSpPr>
+          <p:cNvPr id="3" name="Content Placeholder 2"/>
+          <p:cNvSpPr>
+            <a:spLocks noGrp="1"/>
+          </p:cNvSpPr>
+          <p:nvPr>
+            <p:ph idx="1"/>
+          </p:nvPr>
+        </p:nvSpPr>
+        <p:spPr/>
+        <p:txBody>
+          <a:bodyPr/>
+          <a:lstStyle/>
+          <a:p>
+            <a:r>
+              <a:rPr lang="en-US" dirty="0"/>
+              <a:t>People do not operate in a vacuum</a:t>
+            </a:r>
+          </a:p>
+          <a:p>
+            <a:r>
+              <a:rPr lang="en-US" dirty="0"/>
+              <a:t>Decisions shaped by people they know</a:t>
+            </a:r>
+          </a:p>
+          <a:p>
+            <a:r>
+              <a:rPr lang="en-US" dirty="0"/>
+              <a:t>Decisions also shaped by people who know people who know you</a:t>
+            </a:r>
+          </a:p>
+          <a:p>
+            <a:r>
+              <a:rPr lang="en-US" dirty="0"/>
+              <a:t>Thus allowing for spreading of information, behavior, and </a:t>
+            </a:r>
+            <a:r>
+              <a:rPr lang="en-US" dirty="0" smtClean="0"/>
+              <a:t>outcomes</a:t>
+            </a:r>
+            <a:endParaRPr lang="en-US" dirty="0"/>
+          </a:p>
+        </p:txBody>
+      </p:sp>
+    </p:spTree>
+    <p:extLst>
+      <p:ext uri="{BB962C8B-B14F-4D97-AF65-F5344CB8AC3E}">
+        <p14:creationId xmlns:p14="http://schemas.microsoft.com/office/powerpoint/2010/main" val="710954664"/>
+      </p:ext>
+    </p:extLst>
+  </p:cSld>
+  <p:clrMapOvr>
+    <a:masterClrMapping/>
+  </p:clrMapOvr>
+</p:sld>
+</file>
+
+<file path=ppt/slides/slide5.xml><?xml version="1.0" encoding="utf-8"?>
 <p:sld xmlns:a="http://schemas.openxmlformats.org/drawingml/2006/main" xmlns:r="http://schemas.openxmlformats.org/officeDocument/2006/relationships" xmlns:p="http://schemas.openxmlformats.org/presentationml/2006/main">
   <p:cSld>
     <p:spTree>
@@ -6291,7 +6946,7 @@
 </p:sld>
 </file>
 
-<file path=ppt/slides/slide4.xml><?xml version="1.0" encoding="utf-8"?>
+<file path=ppt/slides/slide6.xml><?xml version="1.0" encoding="utf-8"?>
 <p:sld xmlns:a="http://schemas.openxmlformats.org/drawingml/2006/main" xmlns:r="http://schemas.openxmlformats.org/officeDocument/2006/relationships" xmlns:p="http://schemas.openxmlformats.org/presentationml/2006/main">
   <p:cSld>
     <p:spTree>
@@ -6394,7 +7049,7 @@
 </p:sld>
 </file>
 
-<file path=ppt/slides/slide5.xml><?xml version="1.0" encoding="utf-8"?>
+<file path=ppt/slides/slide7.xml><?xml version="1.0" encoding="utf-8"?>
 <p:sld xmlns:a="http://schemas.openxmlformats.org/drawingml/2006/main" xmlns:r="http://schemas.openxmlformats.org/officeDocument/2006/relationships" xmlns:p="http://schemas.openxmlformats.org/presentationml/2006/main">
   <p:cSld>
     <p:spTree>
@@ -6446,12 +7101,49 @@
         </p:nvSpPr>
         <p:spPr/>
         <p:txBody>
-          <a:bodyPr/>
-          <a:lstStyle/>
-          <a:p>
+          <a:bodyPr>
+            <a:normAutofit lnSpcReduction="10000"/>
+          </a:bodyPr>
+          <a:lstStyle/>
+          <a:p>
+            <a:r>
+              <a:rPr lang="en-US" dirty="0"/>
+              <a:t>A </a:t>
+            </a:r>
+            <a:r>
+              <a:rPr lang="en-US" b="1" i="1" dirty="0"/>
+              <a:t>network</a:t>
+            </a:r>
+            <a:r>
+              <a:rPr lang="en-US" dirty="0"/>
+              <a:t> is a collection of </a:t>
+            </a:r>
+            <a:r>
+              <a:rPr lang="en-US" b="1" dirty="0" smtClean="0"/>
+              <a:t>nodes</a:t>
+            </a:r>
             <a:r>
               <a:rPr lang="en-US" dirty="0" smtClean="0"/>
-              <a:t>Whole network</a:t>
+              <a:t> </a:t>
+            </a:r>
+            <a:r>
+              <a:rPr lang="en-US" dirty="0"/>
+              <a:t>joined by </a:t>
+            </a:r>
+            <a:r>
+              <a:rPr lang="en-US" b="1" dirty="0" smtClean="0"/>
+              <a:t>edges</a:t>
+            </a:r>
+            <a:endParaRPr lang="en-US" dirty="0" smtClean="0"/>
+          </a:p>
+          <a:p>
+            <a:r>
+              <a:rPr lang="en-US" dirty="0" smtClean="0"/>
+              <a:t>Whole </a:t>
+            </a:r>
+            <a:r>
+              <a:rPr lang="en-US" dirty="0" smtClean="0"/>
+              <a:t>network</a:t>
             </a:r>
           </a:p>
           <a:p>
@@ -6557,7 +7249,7 @@
         </p:blipFill>
         <p:spPr bwMode="auto">
           <a:xfrm>
-            <a:off x="7204768" y="1152983"/>
+            <a:off x="7844847" y="1061543"/>
             <a:ext cx="2504498" cy="2380672"/>
           </a:xfrm>
           <a:prstGeom prst="rect">
@@ -6588,7 +7280,7 @@
 </p:sld>
 </file>
 
-<file path=ppt/slides/slide6.xml><?xml version="1.0" encoding="utf-8"?>
+<file path=ppt/slides/slide8.xml><?xml version="1.0" encoding="utf-8"?>
 <p:sld xmlns:a="http://schemas.openxmlformats.org/drawingml/2006/main" xmlns:r="http://schemas.openxmlformats.org/officeDocument/2006/relationships" xmlns:p="http://schemas.openxmlformats.org/presentationml/2006/main">
   <p:cSld>
     <p:spTree>
@@ -6640,7 +7332,9 @@
         </p:nvSpPr>
         <p:spPr/>
         <p:txBody>
-          <a:bodyPr/>
+          <a:bodyPr>
+            <a:normAutofit lnSpcReduction="10000"/>
+          </a:bodyPr>
           <a:lstStyle/>
           <a:p>
             <a:r>
@@ -6654,6 +7348,15 @@
               <a:rPr lang="en-US" dirty="0" smtClean="0"/>
               <a:t>Could be countries, people, cities, etc. </a:t>
             </a:r>
+            <a:endParaRPr lang="en-US" dirty="0" smtClean="0"/>
+          </a:p>
+          <a:p>
+            <a:pPr lvl="1"/>
+            <a:r>
+              <a:rPr lang="en-US" dirty="0" smtClean="0"/>
+              <a:t>Synonyms: Vertex, Sites, Actors</a:t>
+            </a:r>
+            <a:endParaRPr lang="en-US" dirty="0" smtClean="0"/>
           </a:p>
           <a:p>
             <a:r>
@@ -6712,8 +7415,20 @@
             </a:r>
             <a:r>
               <a:rPr lang="en-US" dirty="0"/>
-              <a:t>you care about the nature of the tie?</a:t>
-            </a:r>
+              <a:t>you care about the nature of the tie</a:t>
+            </a:r>
+            <a:r>
+              <a:rPr lang="en-US" dirty="0" smtClean="0"/>
+              <a:t>?</a:t>
+            </a:r>
+          </a:p>
+          <a:p>
+            <a:pPr lvl="1"/>
+            <a:r>
+              <a:rPr lang="en-US" dirty="0" smtClean="0"/>
+              <a:t>Synonyms: Edge, Link, Bond</a:t>
+            </a:r>
+            <a:endParaRPr lang="en-US" dirty="0"/>
           </a:p>
           <a:p>
             <a:pPr lvl="1"/>
@@ -6887,267 +7602,6 @@
 </p:sld>
 </file>
 
-<file path=ppt/slides/slide7.xml><?xml version="1.0" encoding="utf-8"?>
-<p:sld xmlns:a="http://schemas.openxmlformats.org/drawingml/2006/main" xmlns:r="http://schemas.openxmlformats.org/officeDocument/2006/relationships" xmlns:p="http://schemas.openxmlformats.org/presentationml/2006/main">
-  <p:cSld>
-    <p:spTree>
-      <p:nvGrpSpPr>
-        <p:cNvPr id="1" name=""/>
-        <p:cNvGrpSpPr/>
-        <p:nvPr/>
-      </p:nvGrpSpPr>
-      <p:grpSpPr>
-        <a:xfrm>
-          <a:off x="0" y="0"/>
-          <a:ext cx="0" cy="0"/>
-          <a:chOff x="0" y="0"/>
-          <a:chExt cx="0" cy="0"/>
-        </a:xfrm>
-      </p:grpSpPr>
-      <p:sp>
-        <p:nvSpPr>
-          <p:cNvPr id="2" name="Title 1"/>
-          <p:cNvSpPr>
-            <a:spLocks noGrp="1"/>
-          </p:cNvSpPr>
-          <p:nvPr>
-            <p:ph type="title"/>
-          </p:nvPr>
-        </p:nvSpPr>
-        <p:spPr/>
-        <p:txBody>
-          <a:bodyPr/>
-          <a:lstStyle/>
-          <a:p>
-            <a:r>
-              <a:rPr lang="en-US" dirty="0" smtClean="0"/>
-              <a:t>Defining other Terms	</a:t>
-            </a:r>
-            <a:endParaRPr lang="en-US" dirty="0"/>
-          </a:p>
-        </p:txBody>
-      </p:sp>
-      <p:sp>
-        <p:nvSpPr>
-          <p:cNvPr id="3" name="Content Placeholder 2"/>
-          <p:cNvSpPr>
-            <a:spLocks noGrp="1"/>
-          </p:cNvSpPr>
-          <p:nvPr>
-            <p:ph idx="1"/>
-          </p:nvPr>
-        </p:nvSpPr>
-        <p:spPr/>
-        <p:txBody>
-          <a:bodyPr/>
-          <a:lstStyle/>
-          <a:p>
-            <a:r>
-              <a:rPr lang="en-US" dirty="0" smtClean="0"/>
-              <a:t>Homophily- extent to which two nodes are similar</a:t>
-            </a:r>
-          </a:p>
-          <a:p>
-            <a:pPr lvl="1"/>
-            <a:r>
-              <a:rPr lang="en-US" dirty="0" smtClean="0"/>
-              <a:t>How close incomes are</a:t>
-            </a:r>
-          </a:p>
-          <a:p>
-            <a:r>
-              <a:rPr lang="en-US" dirty="0" smtClean="0"/>
-              <a:t>Density- proportion of ties relative to potential ties</a:t>
-            </a:r>
-          </a:p>
-          <a:p>
-            <a:pPr lvl="1"/>
-            <a:r>
-              <a:rPr lang="en-US" dirty="0" smtClean="0"/>
-              <a:t>Out of all possible ties, what proportion are observed</a:t>
-            </a:r>
-          </a:p>
-          <a:p>
-            <a:r>
-              <a:rPr lang="en-US" dirty="0" smtClean="0"/>
-              <a:t>Distance</a:t>
-            </a:r>
-          </a:p>
-          <a:p>
-            <a:pPr lvl="1"/>
-            <a:r>
-              <a:rPr lang="en-US" dirty="0" smtClean="0"/>
-              <a:t>Minimum number of ties needed to connect two nodes</a:t>
-            </a:r>
-          </a:p>
-          <a:p>
-            <a:r>
-              <a:rPr lang="en-US" dirty="0" smtClean="0"/>
-              <a:t>Centrality</a:t>
-            </a:r>
-          </a:p>
-          <a:p>
-            <a:pPr lvl="1"/>
-            <a:r>
-              <a:rPr lang="en-US" dirty="0" smtClean="0"/>
-              <a:t>Importance or influence of a node (more on this later)</a:t>
-            </a:r>
-            <a:endParaRPr lang="en-US" dirty="0"/>
-          </a:p>
-          <a:p>
-            <a:pPr lvl="1"/>
-            <a:endParaRPr lang="en-US" dirty="0" smtClean="0"/>
-          </a:p>
-          <a:p>
-            <a:pPr lvl="1"/>
-            <a:endParaRPr lang="en-US" dirty="0"/>
-          </a:p>
-        </p:txBody>
-      </p:sp>
-    </p:spTree>
-    <p:extLst>
-      <p:ext uri="{BB962C8B-B14F-4D97-AF65-F5344CB8AC3E}">
-        <p14:creationId xmlns:p14="http://schemas.microsoft.com/office/powerpoint/2010/main" val="1676824317"/>
-      </p:ext>
-    </p:extLst>
-  </p:cSld>
-  <p:clrMapOvr>
-    <a:masterClrMapping/>
-  </p:clrMapOvr>
-</p:sld>
-</file>
-
-<file path=ppt/slides/slide8.xml><?xml version="1.0" encoding="utf-8"?>
-<p:sld xmlns:a="http://schemas.openxmlformats.org/drawingml/2006/main" xmlns:r="http://schemas.openxmlformats.org/officeDocument/2006/relationships" xmlns:p="http://schemas.openxmlformats.org/presentationml/2006/main">
-  <p:cSld>
-    <p:spTree>
-      <p:nvGrpSpPr>
-        <p:cNvPr id="1" name=""/>
-        <p:cNvGrpSpPr/>
-        <p:nvPr/>
-      </p:nvGrpSpPr>
-      <p:grpSpPr>
-        <a:xfrm>
-          <a:off x="0" y="0"/>
-          <a:ext cx="0" cy="0"/>
-          <a:chOff x="0" y="0"/>
-          <a:chExt cx="0" cy="0"/>
-        </a:xfrm>
-      </p:grpSpPr>
-      <p:sp>
-        <p:nvSpPr>
-          <p:cNvPr id="2" name="Title 1"/>
-          <p:cNvSpPr>
-            <a:spLocks noGrp="1"/>
-          </p:cNvSpPr>
-          <p:nvPr>
-            <p:ph type="title"/>
-          </p:nvPr>
-        </p:nvSpPr>
-        <p:spPr/>
-        <p:txBody>
-          <a:bodyPr/>
-          <a:lstStyle/>
-          <a:p>
-            <a:r>
-              <a:rPr lang="en-US" dirty="0" smtClean="0"/>
-              <a:t>Data: Adjacency Matrix vs Edge list</a:t>
-            </a:r>
-            <a:endParaRPr lang="en-US" dirty="0"/>
-          </a:p>
-        </p:txBody>
-      </p:sp>
-      <p:sp>
-        <p:nvSpPr>
-          <p:cNvPr id="3" name="Content Placeholder 2"/>
-          <p:cNvSpPr>
-            <a:spLocks noGrp="1"/>
-          </p:cNvSpPr>
-          <p:nvPr>
-            <p:ph idx="1"/>
-          </p:nvPr>
-        </p:nvSpPr>
-        <p:spPr/>
-        <p:txBody>
-          <a:bodyPr/>
-          <a:lstStyle/>
-          <a:p>
-            <a:r>
-              <a:rPr lang="en-US" dirty="0" smtClean="0"/>
-              <a:t>Adjacency Matrix- values show connection between nodes</a:t>
-            </a:r>
-          </a:p>
-          <a:p>
-            <a:pPr lvl="1"/>
-            <a:r>
-              <a:rPr lang="en-US" dirty="0" smtClean="0"/>
-              <a:t>Often omit 0, just care about 1 if binary</a:t>
-            </a:r>
-            <a:endParaRPr lang="en-US" dirty="0"/>
-          </a:p>
-        </p:txBody>
-      </p:sp>
-      <p:pic>
-        <p:nvPicPr>
-          <p:cNvPr id="5" name="Picture 4"/>
-          <p:cNvPicPr>
-            <a:picLocks noChangeAspect="1"/>
-          </p:cNvPicPr>
-          <p:nvPr/>
-        </p:nvPicPr>
-        <p:blipFill>
-          <a:blip r:embed="rId2"/>
-          <a:stretch>
-            <a:fillRect/>
-          </a:stretch>
-        </p:blipFill>
-        <p:spPr>
-          <a:xfrm>
-            <a:off x="1103312" y="3196807"/>
-            <a:ext cx="3593379" cy="3563557"/>
-          </a:xfrm>
-          <a:prstGeom prst="rect">
-            <a:avLst/>
-          </a:prstGeom>
-        </p:spPr>
-      </p:pic>
-      <p:pic>
-        <p:nvPicPr>
-          <p:cNvPr id="6" name="Picture 5"/>
-          <p:cNvPicPr>
-            <a:picLocks noChangeAspect="1"/>
-          </p:cNvPicPr>
-          <p:nvPr/>
-        </p:nvPicPr>
-        <p:blipFill>
-          <a:blip r:embed="rId3"/>
-          <a:stretch>
-            <a:fillRect/>
-          </a:stretch>
-        </p:blipFill>
-        <p:spPr>
-          <a:xfrm>
-            <a:off x="6010753" y="3303241"/>
-            <a:ext cx="3382629" cy="3457123"/>
-          </a:xfrm>
-          <a:prstGeom prst="rect">
-            <a:avLst/>
-          </a:prstGeom>
-        </p:spPr>
-      </p:pic>
-    </p:spTree>
-    <p:extLst>
-      <p:ext uri="{BB962C8B-B14F-4D97-AF65-F5344CB8AC3E}">
-        <p14:creationId xmlns:p14="http://schemas.microsoft.com/office/powerpoint/2010/main" val="3320095233"/>
-      </p:ext>
-    </p:extLst>
-  </p:cSld>
-  <p:clrMapOvr>
-    <a:masterClrMapping/>
-  </p:clrMapOvr>
-</p:sld>
-</file>
-
 <file path=ppt/slides/slide9.xml><?xml version="1.0" encoding="utf-8"?>
 <p:sld xmlns:a="http://schemas.openxmlformats.org/drawingml/2006/main" xmlns:r="http://schemas.openxmlformats.org/officeDocument/2006/relationships" xmlns:p="http://schemas.openxmlformats.org/presentationml/2006/main">
   <p:cSld>
@@ -7181,10 +7635,9 @@
           <a:lstStyle/>
           <a:p>
             <a:r>
-              <a:rPr lang="en-US" dirty="0" err="1" smtClean="0"/>
-              <a:t>Edgelist</a:t>
-            </a:r>
-            <a:endParaRPr lang="en-US" dirty="0"/>
+              <a:rPr lang="en-US" dirty="0"/>
+              <a:t>Examples of Networks?</a:t>
+            </a:r>
           </a:p>
         </p:txBody>
       </p:sp>
@@ -7204,91 +7657,150 @@
           <a:lstStyle/>
           <a:p>
             <a:r>
-              <a:rPr lang="en-US" dirty="0" smtClean="0"/>
-              <a:t>2 columns- node 1, node 2</a:t>
+              <a:rPr lang="en-US" sz="1400" dirty="0"/>
+              <a:t>Social Networks</a:t>
             </a:r>
           </a:p>
           <a:p>
             <a:pPr lvl="1"/>
             <a:r>
-              <a:rPr lang="en-US" dirty="0" smtClean="0"/>
-              <a:t>Sometimes 3</a:t>
-            </a:r>
-            <a:r>
-              <a:rPr lang="en-US" baseline="30000" dirty="0" smtClean="0"/>
-              <a:t>rd</a:t>
-            </a:r>
-            <a:r>
-              <a:rPr lang="en-US" dirty="0" smtClean="0"/>
-              <a:t> column for weight if not binary</a:t>
+              <a:rPr lang="en-US" sz="1200" dirty="0" smtClean="0"/>
+              <a:t>Node </a:t>
+            </a:r>
+            <a:r>
+              <a:rPr lang="en-US" sz="1200" dirty="0"/>
+              <a:t>– Person</a:t>
             </a:r>
           </a:p>
           <a:p>
             <a:pPr lvl="1"/>
             <a:r>
-              <a:rPr lang="en-US" dirty="0" smtClean="0"/>
-              <a:t>Missing edges not included </a:t>
-            </a:r>
-            <a:r>
-              <a:rPr lang="en-US" smtClean="0"/>
-              <a:t>(usually)</a:t>
-            </a:r>
-            <a:endParaRPr lang="en-US" dirty="0"/>
-          </a:p>
-        </p:txBody>
-      </p:sp>
-      <p:pic>
-        <p:nvPicPr>
-          <p:cNvPr id="4" name="Picture 3"/>
-          <p:cNvPicPr>
-            <a:picLocks noChangeAspect="1"/>
-          </p:cNvPicPr>
-          <p:nvPr/>
-        </p:nvPicPr>
-        <p:blipFill>
-          <a:blip r:embed="rId2"/>
-          <a:stretch>
-            <a:fillRect/>
-          </a:stretch>
-        </p:blipFill>
-        <p:spPr>
-          <a:xfrm>
-            <a:off x="8147292" y="1853248"/>
-            <a:ext cx="2297400" cy="4597202"/>
-          </a:xfrm>
-          <a:prstGeom prst="rect">
-            <a:avLst/>
-          </a:prstGeom>
-        </p:spPr>
-      </p:pic>
-      <p:pic>
-        <p:nvPicPr>
-          <p:cNvPr id="5" name="Picture 4"/>
-          <p:cNvPicPr>
-            <a:picLocks noChangeAspect="1"/>
-          </p:cNvPicPr>
-          <p:nvPr/>
-        </p:nvPicPr>
-        <p:blipFill>
-          <a:blip r:embed="rId3"/>
-          <a:stretch>
-            <a:fillRect/>
-          </a:stretch>
-        </p:blipFill>
-        <p:spPr>
-          <a:xfrm>
-            <a:off x="2149643" y="4550826"/>
-            <a:ext cx="4650750" cy="1447200"/>
-          </a:xfrm>
-          <a:prstGeom prst="rect">
-            <a:avLst/>
-          </a:prstGeom>
-        </p:spPr>
-      </p:pic>
+              <a:rPr lang="en-US" sz="1200" dirty="0" smtClean="0"/>
+              <a:t>Tie </a:t>
+            </a:r>
+            <a:r>
+              <a:rPr lang="en-US" sz="1200" dirty="0"/>
+              <a:t>– Friendship, Collaboration</a:t>
+            </a:r>
+          </a:p>
+          <a:p>
+            <a:r>
+              <a:rPr lang="en-US" sz="1400" dirty="0"/>
+              <a:t>Information Networks</a:t>
+            </a:r>
+          </a:p>
+          <a:p>
+            <a:pPr lvl="1"/>
+            <a:r>
+              <a:rPr lang="en-US" sz="1200" dirty="0"/>
+              <a:t>Node</a:t>
+            </a:r>
+            <a:r>
+              <a:rPr lang="en-US" sz="1200" dirty="0" smtClean="0"/>
+              <a:t> </a:t>
+            </a:r>
+            <a:r>
+              <a:rPr lang="en-US" sz="1200" dirty="0"/>
+              <a:t>– Books, Web Pages</a:t>
+            </a:r>
+          </a:p>
+          <a:p>
+            <a:pPr lvl="1"/>
+            <a:r>
+              <a:rPr lang="en-US" sz="1200" dirty="0"/>
+              <a:t>Tie</a:t>
+            </a:r>
+            <a:r>
+              <a:rPr lang="en-US" sz="1200" dirty="0" smtClean="0"/>
+              <a:t> </a:t>
+            </a:r>
+            <a:r>
+              <a:rPr lang="en-US" sz="1200" dirty="0"/>
+              <a:t>– Citations, Hyperlinks</a:t>
+            </a:r>
+          </a:p>
+          <a:p>
+            <a:r>
+              <a:rPr lang="en-US" sz="1400" dirty="0"/>
+              <a:t>Communication Networks</a:t>
+            </a:r>
+          </a:p>
+          <a:p>
+            <a:pPr lvl="1"/>
+            <a:r>
+              <a:rPr lang="en-US" sz="1200" dirty="0"/>
+              <a:t>Node</a:t>
+            </a:r>
+            <a:r>
+              <a:rPr lang="en-US" sz="1200" dirty="0" smtClean="0"/>
+              <a:t> </a:t>
+            </a:r>
+            <a:r>
+              <a:rPr lang="en-US" sz="1200" dirty="0"/>
+              <a:t>– Email Address, Phone Number</a:t>
+            </a:r>
+          </a:p>
+          <a:p>
+            <a:pPr lvl="1"/>
+            <a:r>
+              <a:rPr lang="en-US" sz="1200" dirty="0"/>
+              <a:t>Tie</a:t>
+            </a:r>
+            <a:r>
+              <a:rPr lang="en-US" sz="1200" dirty="0" smtClean="0"/>
+              <a:t> </a:t>
+            </a:r>
+            <a:r>
+              <a:rPr lang="en-US" sz="1200" dirty="0"/>
+              <a:t>– Information Exchange</a:t>
+            </a:r>
+          </a:p>
+          <a:p>
+            <a:r>
+              <a:rPr lang="en-US" sz="1400" dirty="0"/>
+              <a:t>Transportation Networks</a:t>
+            </a:r>
+          </a:p>
+          <a:p>
+            <a:pPr lvl="1"/>
+            <a:r>
+              <a:rPr lang="en-US" sz="1200" dirty="0"/>
+              <a:t>Node</a:t>
+            </a:r>
+            <a:r>
+              <a:rPr lang="en-US" sz="1200" dirty="0" smtClean="0"/>
+              <a:t> </a:t>
+            </a:r>
+            <a:r>
+              <a:rPr lang="en-US" sz="1200" dirty="0"/>
+              <a:t>– Airports, Railway Stations</a:t>
+            </a:r>
+          </a:p>
+          <a:p>
+            <a:pPr lvl="1"/>
+            <a:r>
+              <a:rPr lang="en-US" sz="1200" dirty="0"/>
+              <a:t>Tie</a:t>
+            </a:r>
+            <a:r>
+              <a:rPr lang="en-US" sz="1200" dirty="0" smtClean="0"/>
+              <a:t> </a:t>
+            </a:r>
+            <a:r>
+              <a:rPr lang="en-US" sz="1200" dirty="0"/>
+              <a:t>– Non-stop Travel</a:t>
+            </a:r>
+          </a:p>
+          <a:p>
+            <a:pPr algn="r"/>
+            <a:endParaRPr lang="en-US" dirty="0"/>
+          </a:p>
+        </p:txBody>
+      </p:sp>
     </p:spTree>
     <p:extLst>
       <p:ext uri="{BB962C8B-B14F-4D97-AF65-F5344CB8AC3E}">
-        <p14:creationId xmlns:p14="http://schemas.microsoft.com/office/powerpoint/2010/main" val="684901235"/>
+        <p14:creationId xmlns:p14="http://schemas.microsoft.com/office/powerpoint/2010/main" val="3397279746"/>
       </p:ext>
     </p:extLst>
   </p:cSld>
@@ -7296,6 +7808,14 @@
     <a:masterClrMapping/>
   </p:clrMapOvr>
 </p:sld>
+</file>
+
+<file path=ppt/tags/tag1.xml><?xml version="1.0" encoding="utf-8"?>
+<p:tagLst xmlns:a="http://schemas.openxmlformats.org/drawingml/2006/main" xmlns:r="http://schemas.openxmlformats.org/officeDocument/2006/relationships" xmlns:p="http://schemas.openxmlformats.org/presentationml/2006/main">
+  <p:tag name="MMPROD_NEXTUNIQUEID" val="10009"/>
+  <p:tag name="MMPROD_UIDATA" val="&lt;database version=&quot;11.0&quot;&gt;&lt;object type=&quot;1&quot; unique_id=&quot;10001&quot;&gt;&lt;object type=&quot;2&quot; unique_id=&quot;10646&quot;&gt;&lt;object type=&quot;3&quot; unique_id=&quot;10647&quot;&gt;&lt;property id=&quot;20148&quot; value=&quot;5&quot;/&gt;&lt;property id=&quot;20300&quot; value=&quot;Slide 1 - &amp;quot;Basic Network Analysis using R&amp;quot;&quot;/&gt;&lt;property id=&quot;20307&quot; value=&quot;256&quot;/&gt;&lt;/object&gt;&lt;object type=&quot;3&quot; unique_id=&quot;10648&quot;&gt;&lt;property id=&quot;20148&quot; value=&quot;5&quot;/&gt;&lt;property id=&quot;20300&quot; value=&quot;Slide 2 - &amp;quot;Introduction to Networks&amp;quot;&quot;/&gt;&lt;property id=&quot;20307&quot; value=&quot;257&quot;/&gt;&lt;/object&gt;&lt;object type=&quot;3&quot; unique_id=&quot;10649&quot;&gt;&lt;property id=&quot;20148&quot; value=&quot;5&quot;/&gt;&lt;property id=&quot;20300&quot; value=&quot;Slide 5&quot;/&gt;&lt;property id=&quot;20307&quot; value=&quot;258&quot;/&gt;&lt;/object&gt;&lt;object type=&quot;3&quot; unique_id=&quot;10650&quot;&gt;&lt;property id=&quot;20148&quot; value=&quot;5&quot;/&gt;&lt;property id=&quot;20300&quot; value=&quot;Slide 6 - &amp;quot;Note: Theory matters!&amp;quot;&quot;/&gt;&lt;property id=&quot;20307&quot; value=&quot;259&quot;/&gt;&lt;/object&gt;&lt;object type=&quot;3&quot; unique_id=&quot;10651&quot;&gt;&lt;property id=&quot;20148&quot; value=&quot;5&quot;/&gt;&lt;property id=&quot;20300&quot; value=&quot;Slide 7 - &amp;quot;Terms&amp;quot;&quot;/&gt;&lt;property id=&quot;20307&quot; value=&quot;260&quot;/&gt;&lt;/object&gt;&lt;object type=&quot;3&quot; unique_id=&quot;10652&quot;&gt;&lt;property id=&quot;20148&quot; value=&quot;5&quot;/&gt;&lt;property id=&quot;20300&quot; value=&quot;Slide 8 - &amp;quot;Terms&amp;quot;&quot;/&gt;&lt;property id=&quot;20307&quot; value=&quot;262&quot;/&gt;&lt;/object&gt;&lt;object type=&quot;3&quot; unique_id=&quot;10653&quot;&gt;&lt;property id=&quot;20148&quot; value=&quot;5&quot;/&gt;&lt;property id=&quot;20300&quot; value=&quot;Slide 10 - &amp;quot;Defining other Terms&amp;amp;#x09;&amp;quot;&quot;/&gt;&lt;property id=&quot;20307&quot; value=&quot;261&quot;/&gt;&lt;/object&gt;&lt;object type=&quot;3&quot; unique_id=&quot;10654&quot;&gt;&lt;property id=&quot;20148&quot; value=&quot;5&quot;/&gt;&lt;property id=&quot;20300&quot; value=&quot;Slide 11 - &amp;quot;Data: Adjacency Matrix vs Edge list&amp;quot;&quot;/&gt;&lt;property id=&quot;20307&quot; value=&quot;263&quot;/&gt;&lt;/object&gt;&lt;object type=&quot;3&quot; unique_id=&quot;10655&quot;&gt;&lt;property id=&quot;20148&quot; value=&quot;5&quot;/&gt;&lt;property id=&quot;20300&quot; value=&quot;Slide 12 - &amp;quot;Edgelist&amp;quot;&quot;/&gt;&lt;property id=&quot;20307&quot; value=&quot;264&quot;/&gt;&lt;/object&gt;&lt;object type=&quot;3&quot; unique_id=&quot;10711&quot;&gt;&lt;property id=&quot;20148&quot; value=&quot;5&quot;/&gt;&lt;property id=&quot;20300&quot; value=&quot;Slide 3 - &amp;quot;Who Studies Networks?&amp;quot;&quot;/&gt;&lt;property id=&quot;20307&quot; value=&quot;266&quot;/&gt;&lt;/object&gt;&lt;object type=&quot;3&quot; unique_id=&quot;10712&quot;&gt;&lt;property id=&quot;20148&quot; value=&quot;5&quot;/&gt;&lt;property id=&quot;20300&quot; value=&quot;Slide 4 - &amp;quot;Assumptions&amp;quot;&quot;/&gt;&lt;property id=&quot;20307&quot; value=&quot;265&quot;/&gt;&lt;/object&gt;&lt;object type=&quot;3&quot; unique_id=&quot;10713&quot;&gt;&lt;property id=&quot;20148&quot; value=&quot;5&quot;/&gt;&lt;property id=&quot;20300&quot; value=&quot;Slide 9 - &amp;quot;Examples of Networks?&amp;quot;&quot;/&gt;&lt;property id=&quot;20307&quot; value=&quot;267&quot;/&gt;&lt;/object&gt;&lt;/object&gt;&lt;object type=&quot;8&quot; unique_id=&quot;10666&quot;&gt;&lt;/object&gt;&lt;/object&gt;&lt;/database&gt;"/>
+  <p:tag name="SECTOMILLISECCONVERTED" val="1"/>
+</p:tagLst>
 </file>
 
 <file path=ppt/theme/theme1.xml><?xml version="1.0" encoding="utf-8"?>

</xml_diff>